<commit_message>
Updated Cloud lesson 2 slides; Numbered the scenarios to match the scenario.md file
</commit_message>
<xml_diff>
--- a/Cloud/Lesson 02 - Cloud Service Models/_aaS.pptx
+++ b/Cloud/Lesson 02 - Cloud Service Models/_aaS.pptx
@@ -731,7 +731,7 @@
           <a:p>
             <a:fld id="{904FC0B2-CCAA-46F8-A547-49B8C36E7C87}" type="datetimeFigureOut">
               <a:rPr lang="en-US" smtClean="0"/>
-              <a:t>12/22/25</a:t>
+              <a:t>12/29/25</a:t>
             </a:fld>
             <a:endParaRPr lang="en-US"/>
           </a:p>
@@ -1810,7 +1810,7 @@
           <a:p>
             <a:fld id="{C538490F-AF7A-414D-9DC8-27A6E071856A}" type="datetime1">
               <a:rPr lang="en-US" smtClean="0"/>
-              <a:t>12/22/25</a:t>
+              <a:t>12/29/25</a:t>
             </a:fld>
             <a:endParaRPr lang="en-US"/>
           </a:p>
@@ -5189,7 +5189,7 @@
           <a:p>
             <a:fld id="{C538490F-AF7A-414D-9DC8-27A6E071856A}" type="datetime1">
               <a:rPr lang="en-US" smtClean="0"/>
-              <a:t>12/22/25</a:t>
+              <a:t>12/29/25</a:t>
             </a:fld>
             <a:endParaRPr lang="en-US"/>
           </a:p>
@@ -6979,7 +6979,7 @@
           <a:p>
             <a:fld id="{C538490F-AF7A-414D-9DC8-27A6E071856A}" type="datetime1">
               <a:rPr lang="en-US" smtClean="0"/>
-              <a:t>12/22/25</a:t>
+              <a:t>12/29/25</a:t>
             </a:fld>
             <a:endParaRPr lang="en-US"/>
           </a:p>
@@ -7158,7 +7158,7 @@
           <a:p>
             <a:fld id="{C538490F-AF7A-414D-9DC8-27A6E071856A}" type="datetime1">
               <a:rPr lang="en-US" smtClean="0"/>
-              <a:t>12/22/25</a:t>
+              <a:t>12/29/25</a:t>
             </a:fld>
             <a:endParaRPr lang="en-US"/>
           </a:p>
@@ -7385,7 +7385,7 @@
           <a:p>
             <a:fld id="{C538490F-AF7A-414D-9DC8-27A6E071856A}" type="datetime1">
               <a:rPr lang="en-US" smtClean="0"/>
-              <a:t>12/22/25</a:t>
+              <a:t>12/29/25</a:t>
             </a:fld>
             <a:endParaRPr lang="en-US"/>
           </a:p>
@@ -7675,7 +7675,7 @@
           <a:p>
             <a:fld id="{C538490F-AF7A-414D-9DC8-27A6E071856A}" type="datetime1">
               <a:rPr lang="en-US" smtClean="0"/>
-              <a:t>12/22/25</a:t>
+              <a:t>12/29/25</a:t>
             </a:fld>
             <a:endParaRPr lang="en-US"/>
           </a:p>
@@ -8287,7 +8287,7 @@
           <a:p>
             <a:fld id="{C538490F-AF7A-414D-9DC8-27A6E071856A}" type="datetime1">
               <a:rPr lang="en-US" smtClean="0"/>
-              <a:t>12/22/25</a:t>
+              <a:t>12/29/25</a:t>
             </a:fld>
             <a:endParaRPr lang="en-US"/>
           </a:p>
@@ -9147,7 +9147,7 @@
           <a:p>
             <a:fld id="{C538490F-AF7A-414D-9DC8-27A6E071856A}" type="datetime1">
               <a:rPr lang="en-US" smtClean="0"/>
-              <a:t>12/22/25</a:t>
+              <a:t>12/29/25</a:t>
             </a:fld>
             <a:endParaRPr lang="en-US"/>
           </a:p>
@@ -10250,7 +10250,7 @@
           <a:p>
             <a:fld id="{C538490F-AF7A-414D-9DC8-27A6E071856A}" type="datetime1">
               <a:rPr lang="en-US" smtClean="0"/>
-              <a:t>12/22/25</a:t>
+              <a:t>12/29/25</a:t>
             </a:fld>
             <a:endParaRPr lang="en-US"/>
           </a:p>
@@ -10551,7 +10551,7 @@
           <a:p>
             <a:fld id="{C538490F-AF7A-414D-9DC8-27A6E071856A}" type="datetime1">
               <a:rPr lang="en-US" smtClean="0"/>
-              <a:t>12/22/25</a:t>
+              <a:t>12/29/25</a:t>
             </a:fld>
             <a:endParaRPr lang="en-US"/>
           </a:p>
@@ -11010,7 +11010,7 @@
           <a:p>
             <a:fld id="{C538490F-AF7A-414D-9DC8-27A6E071856A}" type="datetime1">
               <a:rPr lang="en-US" smtClean="0"/>
-              <a:t>12/22/25</a:t>
+              <a:t>12/29/25</a:t>
             </a:fld>
             <a:endParaRPr lang="en-US"/>
           </a:p>
@@ -11161,7 +11161,7 @@
             <a:fld id="{C538490F-AF7A-414D-9DC8-27A6E071856A}" type="datetime1">
               <a:rPr lang="en-US" smtClean="0"/>
               <a:pPr/>
-              <a:t>12/22/25</a:t>
+              <a:t>12/29/25</a:t>
             </a:fld>
             <a:endParaRPr lang="en-US" dirty="0"/>
           </a:p>
@@ -13056,7 +13056,7 @@
           <a:p>
             <a:fld id="{C538490F-AF7A-414D-9DC8-27A6E071856A}" type="datetime1">
               <a:rPr lang="en-US" smtClean="0"/>
-              <a:t>12/22/25</a:t>
+              <a:t>12/29/25</a:t>
             </a:fld>
             <a:endParaRPr lang="en-US"/>
           </a:p>
@@ -13330,7 +13330,7 @@
           <a:p>
             <a:fld id="{C538490F-AF7A-414D-9DC8-27A6E071856A}" type="datetime1">
               <a:rPr lang="en-US" smtClean="0"/>
-              <a:t>12/22/25</a:t>
+              <a:t>12/29/25</a:t>
             </a:fld>
             <a:endParaRPr lang="en-US"/>
           </a:p>
@@ -13601,7 +13601,7 @@
           <a:p>
             <a:fld id="{C538490F-AF7A-414D-9DC8-27A6E071856A}" type="datetime1">
               <a:rPr lang="en-US" smtClean="0"/>
-              <a:t>12/22/25</a:t>
+              <a:t>12/29/25</a:t>
             </a:fld>
             <a:endParaRPr lang="en-US"/>
           </a:p>
@@ -14097,7 +14097,7 @@
           <a:p>
             <a:fld id="{C538490F-AF7A-414D-9DC8-27A6E071856A}" type="datetime1">
               <a:rPr lang="en-US" smtClean="0"/>
-              <a:t>12/22/25</a:t>
+              <a:t>12/29/25</a:t>
             </a:fld>
             <a:endParaRPr lang="en-US"/>
           </a:p>
@@ -14224,7 +14224,7 @@
           <a:p>
             <a:fld id="{9B0E2C7C-076D-4EAD-A3BF-A9ADE4F922A3}" type="datetime1">
               <a:rPr lang="en-US" smtClean="0"/>
-              <a:t>12/22/25</a:t>
+              <a:t>12/29/25</a:t>
             </a:fld>
             <a:endParaRPr lang="en-US"/>
           </a:p>
@@ -14350,7 +14350,7 @@
           <a:p>
             <a:fld id="{C538490F-AF7A-414D-9DC8-27A6E071856A}" type="datetime1">
               <a:rPr lang="en-US" smtClean="0"/>
-              <a:t>12/22/25</a:t>
+              <a:t>12/29/25</a:t>
             </a:fld>
             <a:endParaRPr lang="en-US"/>
           </a:p>
@@ -14588,7 +14588,7 @@
           <a:p>
             <a:fld id="{24EB8F01-D84D-4954-A1B2-8DF4D6BAA2F2}" type="datetime1">
               <a:rPr lang="en-US" smtClean="0"/>
-              <a:t>12/22/25</a:t>
+              <a:t>12/29/25</a:t>
             </a:fld>
             <a:endParaRPr lang="en-US"/>
           </a:p>
@@ -14692,7 +14692,7 @@
           <a:p>
             <a:fld id="{C538490F-AF7A-414D-9DC8-27A6E071856A}" type="datetime1">
               <a:rPr lang="en-US" smtClean="0"/>
-              <a:t>12/22/25</a:t>
+              <a:t>12/29/25</a:t>
             </a:fld>
             <a:endParaRPr lang="en-US"/>
           </a:p>
@@ -15087,7 +15087,7 @@
           <a:p>
             <a:fld id="{C538490F-AF7A-414D-9DC8-27A6E071856A}" type="datetime1">
               <a:rPr lang="en-US" smtClean="0"/>
-              <a:t>12/22/25</a:t>
+              <a:t>12/29/25</a:t>
             </a:fld>
             <a:endParaRPr lang="en-US"/>
           </a:p>
@@ -15349,7 +15349,7 @@
           <a:p>
             <a:fld id="{29A89D7F-DBE8-4BDE-8620-00FDCC00E20F}" type="datetime1">
               <a:rPr lang="en-US" smtClean="0"/>
-              <a:t>12/22/25</a:t>
+              <a:t>12/29/25</a:t>
             </a:fld>
             <a:endParaRPr lang="en-US"/>
           </a:p>
@@ -15607,7 +15607,7 @@
           <a:p>
             <a:fld id="{381326E8-7019-476C-B0D6-BE7F536158AB}" type="datetime1">
               <a:rPr lang="en-US" smtClean="0"/>
-              <a:t>12/22/25</a:t>
+              <a:t>12/29/25</a:t>
             </a:fld>
             <a:endParaRPr lang="en-US"/>
           </a:p>
@@ -15839,7 +15839,7 @@
           <a:p>
             <a:fld id="{E3EF2D14-34EB-4AB7-A883-91D354E6CEDA}" type="datetime1">
               <a:rPr lang="en-US" smtClean="0"/>
-              <a:t>12/22/25</a:t>
+              <a:t>12/29/25</a:t>
             </a:fld>
             <a:endParaRPr lang="en-US"/>
           </a:p>
@@ -16088,7 +16088,7 @@
           <a:p>
             <a:fld id="{C211F67F-49B5-4E96-BB49-9A66581A865E}" type="datetime1">
               <a:rPr lang="en-US" smtClean="0"/>
-              <a:t>12/22/25</a:t>
+              <a:t>12/29/25</a:t>
             </a:fld>
             <a:endParaRPr lang="en-US"/>
           </a:p>
@@ -16329,7 +16329,7 @@
           <a:p>
             <a:fld id="{C538490F-AF7A-414D-9DC8-27A6E071856A}" type="datetime1">
               <a:rPr lang="en-US" smtClean="0"/>
-              <a:t>12/22/25</a:t>
+              <a:t>12/29/25</a:t>
             </a:fld>
             <a:endParaRPr lang="en-US"/>
           </a:p>
@@ -16636,7 +16636,7 @@
           <a:p>
             <a:fld id="{C538490F-AF7A-414D-9DC8-27A6E071856A}" type="datetime1">
               <a:rPr lang="en-US" smtClean="0"/>
-              <a:t>12/22/25</a:t>
+              <a:t>12/29/25</a:t>
             </a:fld>
             <a:endParaRPr lang="en-US"/>
           </a:p>
@@ -17117,7 +17117,7 @@
           <a:p>
             <a:fld id="{C538490F-AF7A-414D-9DC8-27A6E071856A}" type="datetime1">
               <a:rPr lang="en-US" smtClean="0"/>
-              <a:t>12/22/25</a:t>
+              <a:t>12/29/25</a:t>
             </a:fld>
             <a:endParaRPr lang="en-US"/>
           </a:p>
@@ -17754,7 +17754,7 @@
           <a:p>
             <a:fld id="{C538490F-AF7A-414D-9DC8-27A6E071856A}" type="datetime1">
               <a:rPr lang="en-US" smtClean="0"/>
-              <a:t>12/22/25</a:t>
+              <a:t>12/29/25</a:t>
             </a:fld>
             <a:endParaRPr lang="en-US"/>
           </a:p>
@@ -18804,7 +18804,7 @@
           <a:p>
             <a:fld id="{C538490F-AF7A-414D-9DC8-27A6E071856A}" type="datetime1">
               <a:rPr lang="en-US" smtClean="0"/>
-              <a:t>12/22/25</a:t>
+              <a:t>12/29/25</a:t>
             </a:fld>
             <a:endParaRPr lang="en-US"/>
           </a:p>
@@ -19827,7 +19827,7 @@
           <a:p>
             <a:fld id="{C538490F-AF7A-414D-9DC8-27A6E071856A}" type="datetime1">
               <a:rPr lang="en-US" smtClean="0"/>
-              <a:t>12/22/25</a:t>
+              <a:t>12/29/25</a:t>
             </a:fld>
             <a:endParaRPr lang="en-US"/>
           </a:p>
@@ -20185,7 +20185,7 @@
             <a:fld id="{C538490F-AF7A-414D-9DC8-27A6E071856A}" type="datetime1">
               <a:rPr lang="en-US" smtClean="0"/>
               <a:pPr/>
-              <a:t>12/22/25</a:t>
+              <a:t>12/29/25</a:t>
             </a:fld>
             <a:endParaRPr lang="en-US" dirty="0"/>
           </a:p>
@@ -20757,7 +20757,7 @@
           <a:p>
             <a:fld id="{7A3E0868-4E26-4CDC-8A56-D70E2D8B12FE}" type="datetime3">
               <a:rPr lang="en-US" smtClean="0"/>
-              <a:t>22 December 2025</a:t>
+              <a:t>29 December 2025</a:t>
             </a:fld>
             <a:endParaRPr lang="en-US"/>
           </a:p>
@@ -21459,7 +21459,7 @@
           <a:p>
             <a:r>
               <a:rPr lang="en-US" sz="3600" dirty="0"/>
-              <a:t>In Class Scenario #1</a:t>
+              <a:t>In Class Scenario #3</a:t>
             </a:r>
           </a:p>
         </p:txBody>
@@ -21622,7 +21622,7 @@
           <a:p>
             <a:r>
               <a:rPr lang="en-US" sz="3600" dirty="0"/>
-              <a:t>In Class Scenario #2</a:t>
+              <a:t>In Class Scenario #4</a:t>
             </a:r>
           </a:p>
         </p:txBody>
@@ -22411,8 +22411,8 @@
           <a:lstStyle/>
           <a:p>
             <a:r>
-              <a:rPr lang="en-US" sz="3600"/>
-              <a:t>In Class Scenario #1</a:t>
+              <a:rPr lang="en-US" sz="3600" dirty="0"/>
+              <a:t>In Class Scenario #5</a:t>
             </a:r>
           </a:p>
         </p:txBody>
@@ -22440,26 +22440,26 @@
           </a:bodyPr>
           <a:lstStyle/>
           <a:p>
-            <a:endParaRPr lang="en-US"/>
-          </a:p>
-          <a:p>
-            <a:endParaRPr lang="en-US"/>
-          </a:p>
-          <a:p>
-            <a:r>
-              <a:rPr lang="en-US"/>
+            <a:endParaRPr lang="en-US" dirty="0"/>
+          </a:p>
+          <a:p>
+            <a:endParaRPr lang="en-US" dirty="0"/>
+          </a:p>
+          <a:p>
+            <a:r>
+              <a:rPr lang="en-US" dirty="0"/>
               <a:t>What software is available to perform office functions in the cloud (SaaS solutions)?</a:t>
             </a:r>
           </a:p>
           <a:p>
             <a:r>
-              <a:rPr lang="en-US"/>
+              <a:rPr lang="en-US" dirty="0"/>
               <a:t>What are the pros and cons of going to SaaS?</a:t>
             </a:r>
           </a:p>
           <a:p>
             <a:r>
-              <a:rPr lang="en-US"/>
+              <a:rPr lang="en-US" dirty="0"/>
               <a:t>How much does an O365 license cost per month per person for a business this size? (hint: search Microsoft’s site)</a:t>
             </a:r>
           </a:p>
@@ -22467,13 +22467,13 @@
             <a:pPr marL="0" indent="0">
               <a:buNone/>
             </a:pPr>
-            <a:endParaRPr lang="en-US"/>
-          </a:p>
-          <a:p>
-            <a:endParaRPr lang="en-US"/>
-          </a:p>
-          <a:p>
-            <a:endParaRPr lang="en-US"/>
+            <a:endParaRPr lang="en-US" dirty="0"/>
+          </a:p>
+          <a:p>
+            <a:endParaRPr lang="en-US" dirty="0"/>
+          </a:p>
+          <a:p>
+            <a:endParaRPr lang="en-US" dirty="0"/>
           </a:p>
         </p:txBody>
       </p:sp>
@@ -22506,30 +22506,30 @@
           <a:lstStyle/>
           <a:p>
             <a:r>
-              <a:rPr lang="en-US" sz="2400"/>
+              <a:rPr lang="en-US" sz="2400" dirty="0"/>
               <a:t>You just founded a startup company and currently have 10 employees and you are about to hire 20 more because business is booming.  </a:t>
             </a:r>
           </a:p>
           <a:p>
             <a:r>
-              <a:rPr lang="en-US" sz="2400"/>
+              <a:rPr lang="en-US" sz="2400" dirty="0"/>
               <a:t>You have 10 work laptops that have Windows and Office preloaded on them.  </a:t>
             </a:r>
           </a:p>
           <a:p>
-            <a:endParaRPr lang="en-US" sz="2400"/>
-          </a:p>
-          <a:p>
-            <a:r>
-              <a:rPr lang="en-US" sz="2400"/>
+            <a:endParaRPr lang="en-US" sz="2400" dirty="0"/>
+          </a:p>
+          <a:p>
+            <a:r>
+              <a:rPr lang="en-US" sz="2400" dirty="0"/>
               <a:t>Based on your business growing,  you decided to move to a cloud solution instead of buying more standalone office 365 licenses (estimated $150 / installation)</a:t>
             </a:r>
           </a:p>
           <a:p>
-            <a:endParaRPr lang="en-US" sz="2400"/>
-          </a:p>
-          <a:p>
-            <a:endParaRPr lang="en-US" sz="2400"/>
+            <a:endParaRPr lang="en-US" sz="2400" dirty="0"/>
+          </a:p>
+          <a:p>
+            <a:endParaRPr lang="en-US" sz="2400" dirty="0"/>
           </a:p>
         </p:txBody>
       </p:sp>
@@ -22593,7 +22593,7 @@
           <a:p>
             <a:r>
               <a:rPr lang="en-US" sz="3600" dirty="0"/>
-              <a:t>In Class Scenario #2</a:t>
+              <a:t>In Class Scenario #6</a:t>
             </a:r>
           </a:p>
         </p:txBody>
@@ -22616,8 +22616,8 @@
         </p:nvSpPr>
         <p:spPr>
           <a:xfrm>
-            <a:off x="5180012" y="1"/>
-            <a:ext cx="6935788" cy="3797560"/>
+            <a:off x="5178959" y="245029"/>
+            <a:ext cx="6935788" cy="3646418"/>
           </a:xfrm>
         </p:spPr>
         <p:txBody>
@@ -24582,23 +24582,23 @@
             <a:pPr marL="0" indent="0">
               <a:buNone/>
             </a:pPr>
-            <a:endParaRPr lang="en-US"/>
-          </a:p>
-          <a:p>
-            <a:r>
-              <a:rPr lang="en-US"/>
+            <a:endParaRPr lang="en-US" dirty="0"/>
+          </a:p>
+          <a:p>
+            <a:r>
+              <a:rPr lang="en-US" dirty="0"/>
               <a:t>If you have 6 virtual machines in the lab, how long will it take to finish in-house (in days)?</a:t>
             </a:r>
-            <a:endParaRPr lang="en-US">
+            <a:endParaRPr lang="en-US" dirty="0">
               <a:cs typeface="Calibri"/>
             </a:endParaRPr>
           </a:p>
           <a:p>
             <a:r>
-              <a:rPr lang="en-US"/>
+              <a:rPr lang="en-US" dirty="0"/>
               <a:t>In order to accomplish the lab’s goals, you need it completed in 5 days.  How many VMs will you need to provision to complete in this amount of time?</a:t>
             </a:r>
-            <a:endParaRPr lang="en-US">
+            <a:endParaRPr lang="en-US" dirty="0">
               <a:cs typeface="Calibri"/>
             </a:endParaRPr>
           </a:p>
@@ -24633,15 +24633,15 @@
           <a:lstStyle/>
           <a:p>
             <a:r>
-              <a:rPr lang="en-US" sz="2400"/>
+              <a:rPr lang="en-US" sz="2400" dirty="0"/>
               <a:t>You are working in a research lab and your team plans to run a simulation that will produce four terabytes of data and require approximately 2000 hours of compute time on a </a:t>
             </a:r>
             <a:r>
-              <a:rPr lang="en-US" sz="2400" err="1"/>
+              <a:rPr lang="en-US" sz="2400" dirty="0" err="1"/>
               <a:t>vm</a:t>
             </a:r>
             <a:r>
-              <a:rPr lang="en-US" sz="2400"/>
+              <a:rPr lang="en-US" sz="2400" dirty="0"/>
               <a:t> computer.   </a:t>
             </a:r>
           </a:p>
@@ -25703,17 +25703,6 @@
 </file>
 
 <file path=customXml/item1.xml><?xml version="1.0" encoding="utf-8"?>
-<p:properties xmlns:p="http://schemas.microsoft.com/office/2006/metadata/properties" xmlns:xsi="http://www.w3.org/2001/XMLSchema-instance" xmlns:pc="http://schemas.microsoft.com/office/infopath/2007/PartnerControls">
-  <documentManagement>
-    <TaxCatchAll xmlns="0d21ce45-ac74-4917-b707-0621347fb97b" xsi:nil="true"/>
-    <lcf76f155ced4ddcb4097134ff3c332f xmlns="84f26b50-9c23-4a46-98fb-ee8fb2c6a919">
-      <Terms xmlns="http://schemas.microsoft.com/office/infopath/2007/PartnerControls"/>
-    </lcf76f155ced4ddcb4097134ff3c332f>
-  </documentManagement>
-</p:properties>
-</file>
-
-<file path=customXml/item2.xml><?xml version="1.0" encoding="utf-8"?>
 <ct:contentTypeSchema xmlns:ct="http://schemas.microsoft.com/office/2006/metadata/contentType" xmlns:ma="http://schemas.microsoft.com/office/2006/metadata/properties/metaAttributes" ct:_="" ma:_="" ma:contentTypeName="Document" ma:contentTypeID="0x010100191F6B10415C8C49BA03E9B44330F302" ma:contentTypeVersion="18" ma:contentTypeDescription="Create a new document." ma:contentTypeScope="" ma:versionID="39fd3ff69422599b0a0e37edcdb2c498">
   <xsd:schema xmlns:xsd="http://www.w3.org/2001/XMLSchema" xmlns:xs="http://www.w3.org/2001/XMLSchema" xmlns:p="http://schemas.microsoft.com/office/2006/metadata/properties" xmlns:ns2="84f26b50-9c23-4a46-98fb-ee8fb2c6a919" xmlns:ns3="0d21ce45-ac74-4917-b707-0621347fb97b" targetNamespace="http://schemas.microsoft.com/office/2006/metadata/properties" ma:root="true" ma:fieldsID="ab4638aea107b8700b08b40af08ec700" ns2:_="" ns3:_="">
     <xsd:import namespace="84f26b50-9c23-4a46-98fb-ee8fb2c6a919"/>
@@ -25968,6 +25957,17 @@
 </ct:contentTypeSchema>
 </file>
 
+<file path=customXml/item2.xml><?xml version="1.0" encoding="utf-8"?>
+<p:properties xmlns:p="http://schemas.microsoft.com/office/2006/metadata/properties" xmlns:xsi="http://www.w3.org/2001/XMLSchema-instance" xmlns:pc="http://schemas.microsoft.com/office/infopath/2007/PartnerControls">
+  <documentManagement>
+    <TaxCatchAll xmlns="0d21ce45-ac74-4917-b707-0621347fb97b" xsi:nil="true"/>
+    <lcf76f155ced4ddcb4097134ff3c332f xmlns="84f26b50-9c23-4a46-98fb-ee8fb2c6a919">
+      <Terms xmlns="http://schemas.microsoft.com/office/infopath/2007/PartnerControls"/>
+    </lcf76f155ced4ddcb4097134ff3c332f>
+  </documentManagement>
+</p:properties>
+</file>
+
 <file path=customXml/item3.xml><?xml version="1.0" encoding="utf-8"?>
 <?mso-contentType ?>
 <FormTemplates xmlns="http://schemas.microsoft.com/sharepoint/v3/contenttype/forms">
@@ -25978,17 +25978,6 @@
 </file>
 
 <file path=customXml/itemProps1.xml><?xml version="1.0" encoding="utf-8"?>
-<ds:datastoreItem xmlns:ds="http://schemas.openxmlformats.org/officeDocument/2006/customXml" ds:itemID="{825DFCD1-75F9-4820-8196-CAB5785F0AD6}">
-  <ds:schemaRefs>
-    <ds:schemaRef ds:uri="http://schemas.microsoft.com/office/2006/metadata/properties"/>
-    <ds:schemaRef ds:uri="http://schemas.microsoft.com/office/infopath/2007/PartnerControls"/>
-    <ds:schemaRef ds:uri="0d21ce45-ac74-4917-b707-0621347fb97b"/>
-    <ds:schemaRef ds:uri="84f26b50-9c23-4a46-98fb-ee8fb2c6a919"/>
-  </ds:schemaRefs>
-</ds:datastoreItem>
-</file>
-
-<file path=customXml/itemProps2.xml><?xml version="1.0" encoding="utf-8"?>
 <ds:datastoreItem xmlns:ds="http://schemas.openxmlformats.org/officeDocument/2006/customXml" ds:itemID="{E6F53F2E-D1D4-4294-BE46-87784CAEBADE}">
   <ds:schemaRefs>
     <ds:schemaRef ds:uri="http://schemas.microsoft.com/office/2006/metadata/contentType"/>
@@ -26007,6 +25996,17 @@
 </ds:datastoreItem>
 </file>
 
+<file path=customXml/itemProps2.xml><?xml version="1.0" encoding="utf-8"?>
+<ds:datastoreItem xmlns:ds="http://schemas.openxmlformats.org/officeDocument/2006/customXml" ds:itemID="{825DFCD1-75F9-4820-8196-CAB5785F0AD6}">
+  <ds:schemaRefs>
+    <ds:schemaRef ds:uri="http://schemas.microsoft.com/office/2006/metadata/properties"/>
+    <ds:schemaRef ds:uri="http://schemas.microsoft.com/office/infopath/2007/PartnerControls"/>
+    <ds:schemaRef ds:uri="0d21ce45-ac74-4917-b707-0621347fb97b"/>
+    <ds:schemaRef ds:uri="84f26b50-9c23-4a46-98fb-ee8fb2c6a919"/>
+  </ds:schemaRefs>
+</ds:datastoreItem>
+</file>
+
 <file path=customXml/itemProps3.xml><?xml version="1.0" encoding="utf-8"?>
 <ds:datastoreItem xmlns:ds="http://schemas.openxmlformats.org/officeDocument/2006/customXml" ds:itemID="{916AD29F-8D1D-43FF-9A0F-47286C160A39}">
   <ds:schemaRefs>

</xml_diff>